<commit_message>
Presentation upd + project description
</commit_message>
<xml_diff>
--- a/Презентация ВКР.pptx
+++ b/Презентация ВКР.pptx
@@ -14185,7 +14185,7 @@
           <a:p>
             <a:r>
               <a:rPr lang="ru-RU" sz="2400" b="1" dirty="0"/>
-              <a:t>Статический и динамический прогноз</a:t>
+              <a:t>Прогнозы</a:t>
             </a:r>
           </a:p>
         </p:txBody>
@@ -23084,7 +23084,33 @@
                 <a:ea typeface="Tahoma" pitchFamily="34" charset="0"/>
                 <a:cs typeface="Tahoma" pitchFamily="34" charset="0"/>
               </a:rPr>
-              <a:t>Эмпирически подтверждено преимущество динамического подхода с переоценкой моделей для краткосрочного прогнозирования цены криптовалюты.</a:t>
+              <a:t>Эмпирически подтверждено </a:t>
+            </a:r>
+            <a:r>
+              <a:rPr lang="ru-RU" sz="1600">
+                <a:solidFill>
+                  <a:schemeClr val="tx1">
+                    <a:lumMod val="75000"/>
+                    <a:lumOff val="25000"/>
+                  </a:schemeClr>
+                </a:solidFill>
+                <a:ea typeface="Tahoma" pitchFamily="34" charset="0"/>
+                <a:cs typeface="Tahoma" pitchFamily="34" charset="0"/>
+              </a:rPr>
+              <a:t>преимущество рекурсивного </a:t>
+            </a:r>
+            <a:r>
+              <a:rPr lang="ru-RU" sz="1600" dirty="0">
+                <a:solidFill>
+                  <a:schemeClr val="tx1">
+                    <a:lumMod val="75000"/>
+                    <a:lumOff val="25000"/>
+                  </a:schemeClr>
+                </a:solidFill>
+                <a:ea typeface="Tahoma" pitchFamily="34" charset="0"/>
+                <a:cs typeface="Tahoma" pitchFamily="34" charset="0"/>
+              </a:rPr>
+              <a:t>подхода с переоценкой моделей для краткосрочного прогнозирования цены криптовалюты.</a:t>
             </a:r>
           </a:p>
         </p:txBody>
@@ -23374,7 +23400,7 @@
             </a:pPr>
             <a:r>
               <a:rPr lang="ru-RU" sz="1600" dirty="0"/>
-              <a:t>Модели машинного обучения обеспечивают более высокую точность прогнозов по сравнению с эконометрическими моделями при динамическом подходе.</a:t>
+              <a:t>Модели машинного обучения обеспечивают более высокую точность прогнозов по сравнению с эконометрическими моделями при рекурсивном подходе.</a:t>
             </a:r>
           </a:p>
           <a:p>
@@ -23390,7 +23416,7 @@
             </a:pPr>
             <a:r>
               <a:rPr lang="ru-RU" sz="1600" dirty="0"/>
-              <a:t>Модели машинного обучения не подходят для статических прогнозов на длительный срок.</a:t>
+              <a:t>Модели машинного обучения не подходят для динамических прогнозов на длительный срок.</a:t>
             </a:r>
           </a:p>
           <a:p>
@@ -23406,7 +23432,7 @@
             </a:pPr>
             <a:r>
               <a:rPr lang="ru-RU" sz="1600" dirty="0"/>
-              <a:t>Эконометрические модели остаются предпочтительным выбором для среднесрочных прогнозов благодаря лучшей интерпретируемости и устойчивости.</a:t>
+              <a:t>Эконометрические модели остаются предпочтительным выбором для среднесрочных динамических прогнозов благодаря лучшей интерпретируемости и устойчивости.</a:t>
             </a:r>
           </a:p>
         </p:txBody>

</xml_diff>